<commit_message>
use of worktree add command by Harshit Gupta
</commit_message>
<xml_diff>
--- a/git_worktree.pptx
+++ b/git_worktree.pptx
@@ -8,6 +8,8 @@
     <p:sldId id="256" r:id="rId2"/>
     <p:sldId id="257" r:id="rId3"/>
     <p:sldId id="258" r:id="rId4"/>
+    <p:sldId id="259" r:id="rId5"/>
+    <p:sldId id="260" r:id="rId6"/>
   </p:sldIdLst>
   <p:sldSz cx="12192000" cy="6858000"/>
   <p:notesSz cx="6858000" cy="9144000"/>
@@ -106,6 +108,11 @@
       </a:defRPr>
     </a:lvl9pPr>
   </p:defaultTextStyle>
+  <p:extLst>
+    <p:ext uri="{EFAFB233-063F-42B5-8137-9DF3F51BA10A}">
+      <p15:sldGuideLst xmlns:p15="http://schemas.microsoft.com/office/powerpoint/2012/main"/>
+    </p:ext>
+  </p:extLst>
 </p:presentation>
 </file>
 
@@ -258,7 +265,7 @@
           <a:p>
             <a:fld id="{6E1A8973-3A08-FF44-84E8-26C360FD4EBA}" type="datetimeFigureOut">
               <a:rPr lang="en-US" smtClean="0"/>
-              <a:t>1/12/21</a:t>
+              <a:t>1/12/2021</a:t>
             </a:fld>
             <a:endParaRPr lang="en-US"/>
           </a:p>
@@ -458,7 +465,7 @@
           <a:p>
             <a:fld id="{6E1A8973-3A08-FF44-84E8-26C360FD4EBA}" type="datetimeFigureOut">
               <a:rPr lang="en-US" smtClean="0"/>
-              <a:t>1/12/21</a:t>
+              <a:t>1/12/2021</a:t>
             </a:fld>
             <a:endParaRPr lang="en-US"/>
           </a:p>
@@ -668,7 +675,7 @@
           <a:p>
             <a:fld id="{6E1A8973-3A08-FF44-84E8-26C360FD4EBA}" type="datetimeFigureOut">
               <a:rPr lang="en-US" smtClean="0"/>
-              <a:t>1/12/21</a:t>
+              <a:t>1/12/2021</a:t>
             </a:fld>
             <a:endParaRPr lang="en-US"/>
           </a:p>
@@ -868,7 +875,7 @@
           <a:p>
             <a:fld id="{6E1A8973-3A08-FF44-84E8-26C360FD4EBA}" type="datetimeFigureOut">
               <a:rPr lang="en-US" smtClean="0"/>
-              <a:t>1/12/21</a:t>
+              <a:t>1/12/2021</a:t>
             </a:fld>
             <a:endParaRPr lang="en-US"/>
           </a:p>
@@ -1144,7 +1151,7 @@
           <a:p>
             <a:fld id="{6E1A8973-3A08-FF44-84E8-26C360FD4EBA}" type="datetimeFigureOut">
               <a:rPr lang="en-US" smtClean="0"/>
-              <a:t>1/12/21</a:t>
+              <a:t>1/12/2021</a:t>
             </a:fld>
             <a:endParaRPr lang="en-US"/>
           </a:p>
@@ -1412,7 +1419,7 @@
           <a:p>
             <a:fld id="{6E1A8973-3A08-FF44-84E8-26C360FD4EBA}" type="datetimeFigureOut">
               <a:rPr lang="en-US" smtClean="0"/>
-              <a:t>1/12/21</a:t>
+              <a:t>1/12/2021</a:t>
             </a:fld>
             <a:endParaRPr lang="en-US"/>
           </a:p>
@@ -1827,7 +1834,7 @@
           <a:p>
             <a:fld id="{6E1A8973-3A08-FF44-84E8-26C360FD4EBA}" type="datetimeFigureOut">
               <a:rPr lang="en-US" smtClean="0"/>
-              <a:t>1/12/21</a:t>
+              <a:t>1/12/2021</a:t>
             </a:fld>
             <a:endParaRPr lang="en-US"/>
           </a:p>
@@ -1969,7 +1976,7 @@
           <a:p>
             <a:fld id="{6E1A8973-3A08-FF44-84E8-26C360FD4EBA}" type="datetimeFigureOut">
               <a:rPr lang="en-US" smtClean="0"/>
-              <a:t>1/12/21</a:t>
+              <a:t>1/12/2021</a:t>
             </a:fld>
             <a:endParaRPr lang="en-US"/>
           </a:p>
@@ -2082,7 +2089,7 @@
           <a:p>
             <a:fld id="{6E1A8973-3A08-FF44-84E8-26C360FD4EBA}" type="datetimeFigureOut">
               <a:rPr lang="en-US" smtClean="0"/>
-              <a:t>1/12/21</a:t>
+              <a:t>1/12/2021</a:t>
             </a:fld>
             <a:endParaRPr lang="en-US"/>
           </a:p>
@@ -2395,7 +2402,7 @@
           <a:p>
             <a:fld id="{6E1A8973-3A08-FF44-84E8-26C360FD4EBA}" type="datetimeFigureOut">
               <a:rPr lang="en-US" smtClean="0"/>
-              <a:t>1/12/21</a:t>
+              <a:t>1/12/2021</a:t>
             </a:fld>
             <a:endParaRPr lang="en-US"/>
           </a:p>
@@ -2684,7 +2691,7 @@
           <a:p>
             <a:fld id="{6E1A8973-3A08-FF44-84E8-26C360FD4EBA}" type="datetimeFigureOut">
               <a:rPr lang="en-US" smtClean="0"/>
-              <a:t>1/12/21</a:t>
+              <a:t>1/12/2021</a:t>
             </a:fld>
             <a:endParaRPr lang="en-US"/>
           </a:p>
@@ -2927,7 +2934,7 @@
           <a:p>
             <a:fld id="{6E1A8973-3A08-FF44-84E8-26C360FD4EBA}" type="datetimeFigureOut">
               <a:rPr lang="en-US" smtClean="0"/>
-              <a:t>1/12/21</a:t>
+              <a:t>1/12/2021</a:t>
             </a:fld>
             <a:endParaRPr lang="en-US"/>
           </a:p>
@@ -3766,6 +3773,237 @@
 </p:sld>
 </file>
 
+<file path=ppt/slides/slide4.xml><?xml version="1.0" encoding="utf-8"?>
+<p:sld xmlns:a="http://schemas.openxmlformats.org/drawingml/2006/main" xmlns:r="http://schemas.openxmlformats.org/officeDocument/2006/relationships" xmlns:p="http://schemas.openxmlformats.org/presentationml/2006/main">
+  <p:cSld>
+    <p:spTree>
+      <p:nvGrpSpPr>
+        <p:cNvPr id="1" name=""/>
+        <p:cNvGrpSpPr/>
+        <p:nvPr/>
+      </p:nvGrpSpPr>
+      <p:grpSpPr>
+        <a:xfrm>
+          <a:off x="0" y="0"/>
+          <a:ext cx="0" cy="0"/>
+          <a:chOff x="0" y="0"/>
+          <a:chExt cx="0" cy="0"/>
+        </a:xfrm>
+      </p:grpSpPr>
+      <p:sp>
+        <p:nvSpPr>
+          <p:cNvPr id="2" name="Title 1"/>
+          <p:cNvSpPr>
+            <a:spLocks noGrp="1"/>
+          </p:cNvSpPr>
+          <p:nvPr>
+            <p:ph type="title"/>
+          </p:nvPr>
+        </p:nvSpPr>
+        <p:spPr/>
+        <p:txBody>
+          <a:bodyPr/>
+          <a:lstStyle/>
+          <a:p>
+            <a:r>
+              <a:rPr lang="en-US" dirty="0" err="1" smtClean="0"/>
+              <a:t>git</a:t>
+            </a:r>
+            <a:r>
+              <a:rPr lang="en-US" dirty="0" smtClean="0"/>
+              <a:t> </a:t>
+            </a:r>
+            <a:r>
+              <a:rPr lang="en-US" dirty="0" err="1"/>
+              <a:t>w</a:t>
+            </a:r>
+            <a:r>
+              <a:rPr lang="en-US" dirty="0" err="1" smtClean="0"/>
+              <a:t>orktree</a:t>
+            </a:r>
+            <a:r>
+              <a:rPr lang="en-US" dirty="0" smtClean="0"/>
+              <a:t> add   </a:t>
+            </a:r>
+            <a:endParaRPr lang="en-US" dirty="0"/>
+          </a:p>
+        </p:txBody>
+      </p:sp>
+      <p:sp>
+        <p:nvSpPr>
+          <p:cNvPr id="5" name="Content Placeholder 4"/>
+          <p:cNvSpPr>
+            <a:spLocks noGrp="1"/>
+          </p:cNvSpPr>
+          <p:nvPr>
+            <p:ph idx="1"/>
+          </p:nvPr>
+        </p:nvSpPr>
+        <p:spPr/>
+        <p:txBody>
+          <a:bodyPr/>
+          <a:lstStyle/>
+          <a:p>
+            <a:r>
+              <a:rPr lang="en-US" dirty="0" smtClean="0"/>
+              <a:t>This command is used to create a new </a:t>
+            </a:r>
+            <a:r>
+              <a:rPr lang="en-US" dirty="0" err="1" smtClean="0"/>
+              <a:t>worktree</a:t>
+            </a:r>
+            <a:r>
+              <a:rPr lang="en-US" dirty="0" smtClean="0"/>
+              <a:t> in repository .</a:t>
+            </a:r>
+          </a:p>
+          <a:p>
+            <a:r>
+              <a:rPr lang="en-US" dirty="0" err="1" smtClean="0"/>
+              <a:t>Git</a:t>
+            </a:r>
+            <a:r>
+              <a:rPr lang="en-US" dirty="0"/>
+              <a:t> </a:t>
+            </a:r>
+            <a:r>
+              <a:rPr lang="en-US" dirty="0" err="1" smtClean="0"/>
+              <a:t>worktree</a:t>
+            </a:r>
+            <a:r>
+              <a:rPr lang="en-US" dirty="0" smtClean="0"/>
+              <a:t> add </a:t>
+            </a:r>
+            <a:r>
+              <a:rPr lang="en-US" dirty="0" err="1" smtClean="0"/>
+              <a:t>new_worktree</a:t>
+            </a:r>
+            <a:r>
+              <a:rPr lang="en-US" dirty="0" smtClean="0"/>
+              <a:t>  </a:t>
+            </a:r>
+            <a:r>
+              <a:rPr lang="en-US" dirty="0" err="1" smtClean="0"/>
+              <a:t>branch_name</a:t>
+            </a:r>
+            <a:endParaRPr lang="en-US" dirty="0" smtClean="0"/>
+          </a:p>
+          <a:p>
+            <a:endParaRPr lang="en-US" dirty="0"/>
+          </a:p>
+        </p:txBody>
+      </p:sp>
+      <p:pic>
+        <p:nvPicPr>
+          <p:cNvPr id="6" name="Content Placeholder 3"/>
+          <p:cNvPicPr>
+            <a:picLocks noChangeAspect="1"/>
+          </p:cNvPicPr>
+          <p:nvPr/>
+        </p:nvPicPr>
+        <p:blipFill>
+          <a:blip r:embed="rId2">
+            <a:extLst>
+              <a:ext uri="{28A0092B-C50C-407E-A947-70E740481C1C}">
+                <a14:useLocalDpi xmlns:a14="http://schemas.microsoft.com/office/drawing/2010/main" val="0"/>
+              </a:ext>
+            </a:extLst>
+          </a:blip>
+          <a:stretch>
+            <a:fillRect/>
+          </a:stretch>
+        </p:blipFill>
+        <p:spPr>
+          <a:xfrm>
+            <a:off x="1814945" y="3620241"/>
+            <a:ext cx="6557847" cy="2240232"/>
+          </a:xfrm>
+          <a:prstGeom prst="rect">
+            <a:avLst/>
+          </a:prstGeom>
+        </p:spPr>
+      </p:pic>
+    </p:spTree>
+    <p:extLst>
+      <p:ext uri="{BB962C8B-B14F-4D97-AF65-F5344CB8AC3E}">
+        <p14:creationId xmlns:p14="http://schemas.microsoft.com/office/powerpoint/2010/main" val="1985614971"/>
+      </p:ext>
+    </p:extLst>
+  </p:cSld>
+  <p:clrMapOvr>
+    <a:masterClrMapping/>
+  </p:clrMapOvr>
+</p:sld>
+</file>
+
+<file path=ppt/slides/slide5.xml><?xml version="1.0" encoding="utf-8"?>
+<p:sld xmlns:a="http://schemas.openxmlformats.org/drawingml/2006/main" xmlns:r="http://schemas.openxmlformats.org/officeDocument/2006/relationships" xmlns:p="http://schemas.openxmlformats.org/presentationml/2006/main">
+  <p:cSld>
+    <p:spTree>
+      <p:nvGrpSpPr>
+        <p:cNvPr id="1" name=""/>
+        <p:cNvGrpSpPr/>
+        <p:nvPr/>
+      </p:nvGrpSpPr>
+      <p:grpSpPr>
+        <a:xfrm>
+          <a:off x="0" y="0"/>
+          <a:ext cx="0" cy="0"/>
+          <a:chOff x="0" y="0"/>
+          <a:chExt cx="0" cy="0"/>
+        </a:xfrm>
+      </p:grpSpPr>
+      <p:sp>
+        <p:nvSpPr>
+          <p:cNvPr id="2" name="Title 1"/>
+          <p:cNvSpPr>
+            <a:spLocks noGrp="1"/>
+          </p:cNvSpPr>
+          <p:nvPr>
+            <p:ph type="title"/>
+          </p:nvPr>
+        </p:nvSpPr>
+        <p:spPr/>
+        <p:txBody>
+          <a:bodyPr/>
+          <a:lstStyle/>
+          <a:p>
+            <a:endParaRPr lang="en-US" dirty="0"/>
+          </a:p>
+        </p:txBody>
+      </p:sp>
+      <p:sp>
+        <p:nvSpPr>
+          <p:cNvPr id="5" name="Content Placeholder 4"/>
+          <p:cNvSpPr>
+            <a:spLocks noGrp="1"/>
+          </p:cNvSpPr>
+          <p:nvPr>
+            <p:ph idx="1"/>
+          </p:nvPr>
+        </p:nvSpPr>
+        <p:spPr/>
+        <p:txBody>
+          <a:bodyPr/>
+          <a:lstStyle/>
+          <a:p>
+            <a:endParaRPr lang="en-US"/>
+          </a:p>
+        </p:txBody>
+      </p:sp>
+    </p:spTree>
+    <p:extLst>
+      <p:ext uri="{BB962C8B-B14F-4D97-AF65-F5344CB8AC3E}">
+        <p14:creationId xmlns:p14="http://schemas.microsoft.com/office/powerpoint/2010/main" val="1906067526"/>
+      </p:ext>
+    </p:extLst>
+  </p:cSld>
+  <p:clrMapOvr>
+    <a:masterClrMapping/>
+  </p:clrMapOvr>
+</p:sld>
+</file>
+
 <file path=ppt/theme/theme1.xml><?xml version="1.0" encoding="utf-8"?>
 <a:theme xmlns:a="http://schemas.openxmlformats.org/drawingml/2006/main" name="Office Theme">
   <a:themeElements>

</xml_diff>